<commit_message>
kennisclip objecten als type
</commit_message>
<xml_diff>
--- a/_SLIDES/DEEL2/les4B_object in methoden.pptx
+++ b/_SLIDES/DEEL2/les4B_object in methoden.pptx
@@ -118,6 +118,11 @@
       </a:defRPr>
     </a:lvl9pPr>
   </p:defaultTextStyle>
+  <p:extLst>
+    <p:ext uri="{EFAFB233-063F-42B5-8137-9DF3F51BA10A}">
+      <p15:sldGuideLst xmlns:p15="http://schemas.microsoft.com/office/powerpoint/2012/main"/>
+    </p:ext>
+  </p:extLst>
 </p:presentation>
 </file>
 
@@ -1647,7 +1652,7 @@
               <a:pPr>
                 <a:defRPr/>
               </a:pPr>
-              <a:t>2/20/2019</a:t>
+              <a:t>3/4/2020</a:t>
             </a:fld>
             <a:endParaRPr lang="en-CA"/>
           </a:p>

</xml_diff>